<commit_message>
Added web to demo.pptx
</commit_message>
<xml_diff>
--- a/Intermediate demo/Demo.pptx
+++ b/Intermediate demo/Demo.pptx
@@ -7,10 +7,13 @@
   <p:sldIdLst>
     <p:sldId id="256" r:id="rId2"/>
     <p:sldId id="263" r:id="rId3"/>
-    <p:sldId id="258" r:id="rId4"/>
-    <p:sldId id="262" r:id="rId5"/>
-    <p:sldId id="260" r:id="rId6"/>
-    <p:sldId id="261" r:id="rId7"/>
+    <p:sldId id="266" r:id="rId4"/>
+    <p:sldId id="258" r:id="rId5"/>
+    <p:sldId id="262" r:id="rId6"/>
+    <p:sldId id="260" r:id="rId7"/>
+    <p:sldId id="264" r:id="rId8"/>
+    <p:sldId id="261" r:id="rId9"/>
+    <p:sldId id="265" r:id="rId10"/>
   </p:sldIdLst>
   <p:sldSz cx="9144000" cy="6858000" type="screen4x3"/>
   <p:notesSz cx="6858000" cy="9144000"/>
@@ -293,7 +296,7 @@
           <a:p>
             <a:fld id="{C29160A7-5F71-2B44-B5DD-B5EECC5B0C89}" type="datetimeFigureOut">
               <a:rPr lang="en-US" smtClean="0"/>
-              <a:t>11/20/2014</a:t>
+              <a:t>20/11/14</a:t>
             </a:fld>
             <a:endParaRPr lang="nl-BE"/>
           </a:p>
@@ -335,7 +338,7 @@
           <a:p>
             <a:fld id="{399A7B18-4CF9-2C4D-A962-DC5233A676A7}" type="slidenum">
               <a:rPr lang="nl-BE" smtClean="0"/>
-              <a:t>‹nr.›</a:t>
+              <a:t>‹#›</a:t>
             </a:fld>
             <a:endParaRPr lang="nl-BE"/>
           </a:p>
@@ -463,7 +466,7 @@
           <a:p>
             <a:fld id="{C29160A7-5F71-2B44-B5DD-B5EECC5B0C89}" type="datetimeFigureOut">
               <a:rPr lang="en-US" smtClean="0"/>
-              <a:t>11/20/2014</a:t>
+              <a:t>20/11/14</a:t>
             </a:fld>
             <a:endParaRPr lang="nl-BE"/>
           </a:p>
@@ -505,7 +508,7 @@
           <a:p>
             <a:fld id="{399A7B18-4CF9-2C4D-A962-DC5233A676A7}" type="slidenum">
               <a:rPr lang="nl-BE" smtClean="0"/>
-              <a:t>‹nr.›</a:t>
+              <a:t>‹#›</a:t>
             </a:fld>
             <a:endParaRPr lang="nl-BE"/>
           </a:p>
@@ -643,7 +646,7 @@
           <a:p>
             <a:fld id="{C29160A7-5F71-2B44-B5DD-B5EECC5B0C89}" type="datetimeFigureOut">
               <a:rPr lang="en-US" smtClean="0"/>
-              <a:t>11/20/2014</a:t>
+              <a:t>20/11/14</a:t>
             </a:fld>
             <a:endParaRPr lang="nl-BE"/>
           </a:p>
@@ -685,7 +688,7 @@
           <a:p>
             <a:fld id="{399A7B18-4CF9-2C4D-A962-DC5233A676A7}" type="slidenum">
               <a:rPr lang="nl-BE" smtClean="0"/>
-              <a:t>‹nr.›</a:t>
+              <a:t>‹#›</a:t>
             </a:fld>
             <a:endParaRPr lang="nl-BE"/>
           </a:p>
@@ -813,7 +816,7 @@
           <a:p>
             <a:fld id="{C29160A7-5F71-2B44-B5DD-B5EECC5B0C89}" type="datetimeFigureOut">
               <a:rPr lang="en-US" smtClean="0"/>
-              <a:t>11/20/2014</a:t>
+              <a:t>20/11/14</a:t>
             </a:fld>
             <a:endParaRPr lang="nl-BE"/>
           </a:p>
@@ -855,7 +858,7 @@
           <a:p>
             <a:fld id="{399A7B18-4CF9-2C4D-A962-DC5233A676A7}" type="slidenum">
               <a:rPr lang="nl-BE" smtClean="0"/>
-              <a:t>‹nr.›</a:t>
+              <a:t>‹#›</a:t>
             </a:fld>
             <a:endParaRPr lang="nl-BE"/>
           </a:p>
@@ -1059,7 +1062,7 @@
           <a:p>
             <a:fld id="{C29160A7-5F71-2B44-B5DD-B5EECC5B0C89}" type="datetimeFigureOut">
               <a:rPr lang="en-US" smtClean="0"/>
-              <a:t>11/20/2014</a:t>
+              <a:t>20/11/14</a:t>
             </a:fld>
             <a:endParaRPr lang="nl-BE"/>
           </a:p>
@@ -1101,7 +1104,7 @@
           <a:p>
             <a:fld id="{399A7B18-4CF9-2C4D-A962-DC5233A676A7}" type="slidenum">
               <a:rPr lang="nl-BE" smtClean="0"/>
-              <a:t>‹nr.›</a:t>
+              <a:t>‹#›</a:t>
             </a:fld>
             <a:endParaRPr lang="nl-BE"/>
           </a:p>
@@ -1347,7 +1350,7 @@
           <a:p>
             <a:fld id="{C29160A7-5F71-2B44-B5DD-B5EECC5B0C89}" type="datetimeFigureOut">
               <a:rPr lang="en-US" smtClean="0"/>
-              <a:t>11/20/2014</a:t>
+              <a:t>20/11/14</a:t>
             </a:fld>
             <a:endParaRPr lang="nl-BE"/>
           </a:p>
@@ -1389,7 +1392,7 @@
           <a:p>
             <a:fld id="{399A7B18-4CF9-2C4D-A962-DC5233A676A7}" type="slidenum">
               <a:rPr lang="nl-BE" smtClean="0"/>
-              <a:t>‹nr.›</a:t>
+              <a:t>‹#›</a:t>
             </a:fld>
             <a:endParaRPr lang="nl-BE"/>
           </a:p>
@@ -1769,7 +1772,7 @@
           <a:p>
             <a:fld id="{C29160A7-5F71-2B44-B5DD-B5EECC5B0C89}" type="datetimeFigureOut">
               <a:rPr lang="en-US" smtClean="0"/>
-              <a:t>11/20/2014</a:t>
+              <a:t>20/11/14</a:t>
             </a:fld>
             <a:endParaRPr lang="nl-BE"/>
           </a:p>
@@ -1811,7 +1814,7 @@
           <a:p>
             <a:fld id="{399A7B18-4CF9-2C4D-A962-DC5233A676A7}" type="slidenum">
               <a:rPr lang="nl-BE" smtClean="0"/>
-              <a:t>‹nr.›</a:t>
+              <a:t>‹#›</a:t>
             </a:fld>
             <a:endParaRPr lang="nl-BE"/>
           </a:p>
@@ -1887,7 +1890,7 @@
           <a:p>
             <a:fld id="{C29160A7-5F71-2B44-B5DD-B5EECC5B0C89}" type="datetimeFigureOut">
               <a:rPr lang="en-US" smtClean="0"/>
-              <a:t>11/20/2014</a:t>
+              <a:t>20/11/14</a:t>
             </a:fld>
             <a:endParaRPr lang="nl-BE"/>
           </a:p>
@@ -1929,7 +1932,7 @@
           <a:p>
             <a:fld id="{399A7B18-4CF9-2C4D-A962-DC5233A676A7}" type="slidenum">
               <a:rPr lang="nl-BE" smtClean="0"/>
-              <a:t>‹nr.›</a:t>
+              <a:t>‹#›</a:t>
             </a:fld>
             <a:endParaRPr lang="nl-BE"/>
           </a:p>
@@ -1982,7 +1985,7 @@
           <a:p>
             <a:fld id="{C29160A7-5F71-2B44-B5DD-B5EECC5B0C89}" type="datetimeFigureOut">
               <a:rPr lang="en-US" smtClean="0"/>
-              <a:t>11/20/2014</a:t>
+              <a:t>20/11/14</a:t>
             </a:fld>
             <a:endParaRPr lang="nl-BE"/>
           </a:p>
@@ -2024,7 +2027,7 @@
           <a:p>
             <a:fld id="{399A7B18-4CF9-2C4D-A962-DC5233A676A7}" type="slidenum">
               <a:rPr lang="nl-BE" smtClean="0"/>
-              <a:t>‹nr.›</a:t>
+              <a:t>‹#›</a:t>
             </a:fld>
             <a:endParaRPr lang="nl-BE"/>
           </a:p>
@@ -2259,7 +2262,7 @@
           <a:p>
             <a:fld id="{C29160A7-5F71-2B44-B5DD-B5EECC5B0C89}" type="datetimeFigureOut">
               <a:rPr lang="en-US" smtClean="0"/>
-              <a:t>11/20/2014</a:t>
+              <a:t>20/11/14</a:t>
             </a:fld>
             <a:endParaRPr lang="nl-BE"/>
           </a:p>
@@ -2301,7 +2304,7 @@
           <a:p>
             <a:fld id="{399A7B18-4CF9-2C4D-A962-DC5233A676A7}" type="slidenum">
               <a:rPr lang="nl-BE" smtClean="0"/>
-              <a:t>‹nr.›</a:t>
+              <a:t>‹#›</a:t>
             </a:fld>
             <a:endParaRPr lang="nl-BE"/>
           </a:p>
@@ -2512,7 +2515,7 @@
           <a:p>
             <a:fld id="{C29160A7-5F71-2B44-B5DD-B5EECC5B0C89}" type="datetimeFigureOut">
               <a:rPr lang="en-US" smtClean="0"/>
-              <a:t>11/20/2014</a:t>
+              <a:t>20/11/14</a:t>
             </a:fld>
             <a:endParaRPr lang="nl-BE"/>
           </a:p>
@@ -2554,7 +2557,7 @@
           <a:p>
             <a:fld id="{399A7B18-4CF9-2C4D-A962-DC5233A676A7}" type="slidenum">
               <a:rPr lang="nl-BE" smtClean="0"/>
-              <a:t>‹nr.›</a:t>
+              <a:t>‹#›</a:t>
             </a:fld>
             <a:endParaRPr lang="nl-BE"/>
           </a:p>
@@ -2725,7 +2728,7 @@
           <a:p>
             <a:fld id="{C29160A7-5F71-2B44-B5DD-B5EECC5B0C89}" type="datetimeFigureOut">
               <a:rPr lang="en-US" smtClean="0"/>
-              <a:t>11/20/2014</a:t>
+              <a:t>20/11/14</a:t>
             </a:fld>
             <a:endParaRPr lang="nl-BE"/>
           </a:p>
@@ -2803,7 +2806,7 @@
           <a:p>
             <a:fld id="{399A7B18-4CF9-2C4D-A962-DC5233A676A7}" type="slidenum">
               <a:rPr lang="nl-BE" smtClean="0"/>
-              <a:t>‹nr.›</a:t>
+              <a:t>‹#›</a:t>
             </a:fld>
             <a:endParaRPr lang="nl-BE"/>
           </a:p>
@@ -3117,11 +3120,7 @@
           <a:p>
             <a:r>
               <a:rPr lang="nl-BE" dirty="0" smtClean="0"/>
-              <a:t>P&amp;O </a:t>
-            </a:r>
-            <a:r>
-              <a:rPr lang="nl-BE" dirty="0" smtClean="0"/>
-              <a:t>3</a:t>
+              <a:t>P&amp;O 3</a:t>
             </a:r>
             <a:endParaRPr lang="nl-BE" dirty="0"/>
           </a:p>
@@ -3153,11 +3152,7 @@
             </a:r>
             <a:r>
               <a:rPr lang="nl-BE" dirty="0" smtClean="0"/>
-              <a:t> </a:t>
-            </a:r>
-            <a:r>
-              <a:rPr lang="nl-BE" dirty="0" smtClean="0"/>
-              <a:t>demo</a:t>
+              <a:t> demo</a:t>
             </a:r>
           </a:p>
           <a:p>
@@ -3289,7 +3284,7 @@
       </p:grpSpPr>
       <p:sp>
         <p:nvSpPr>
-          <p:cNvPr id="2" name="Title 1"/>
+          <p:cNvPr id="2" name="Titel 1"/>
           <p:cNvSpPr>
             <a:spLocks noGrp="1"/>
           </p:cNvSpPr>
@@ -3299,22 +3294,20 @@
         </p:nvSpPr>
         <p:spPr/>
         <p:txBody>
-          <a:bodyPr>
-            <a:normAutofit/>
-          </a:bodyPr>
-          <a:lstStyle/>
-          <a:p>
-            <a:r>
-              <a:rPr lang="nl-BE" dirty="0" smtClean="0"/>
-              <a:t>Sensors</a:t>
-            </a:r>
-            <a:endParaRPr lang="nl-BE" dirty="0"/>
-          </a:p>
-        </p:txBody>
-      </p:sp>
-      <p:sp>
-        <p:nvSpPr>
-          <p:cNvPr id="3" name="Content Placeholder 2"/>
+          <a:bodyPr/>
+          <a:lstStyle/>
+          <a:p>
+            <a:r>
+              <a:rPr lang="en-GB" dirty="0" smtClean="0"/>
+              <a:t>Progress</a:t>
+            </a:r>
+            <a:endParaRPr lang="en-GB" dirty="0"/>
+          </a:p>
+        </p:txBody>
+      </p:sp>
+      <p:sp>
+        <p:nvSpPr>
+          <p:cNvPr id="3" name="Tijdelijke aanduiding voor inhoud 2"/>
           <p:cNvSpPr>
             <a:spLocks noGrp="1"/>
           </p:cNvSpPr>
@@ -3328,34 +3321,34 @@
           <a:lstStyle/>
           <a:p>
             <a:r>
-              <a:rPr lang="nl-BE" dirty="0" err="1" smtClean="0"/>
-              <a:t>Raspberry</a:t>
-            </a:r>
-            <a:r>
-              <a:rPr lang="nl-BE" dirty="0" smtClean="0"/>
-              <a:t> Pi</a:t>
-            </a:r>
-          </a:p>
-          <a:p>
-            <a:r>
-              <a:rPr lang="nl-BE" dirty="0" err="1" smtClean="0"/>
-              <a:t>Arduino</a:t>
-            </a:r>
-            <a:endParaRPr lang="nl-BE" dirty="0" smtClean="0"/>
-          </a:p>
-          <a:p>
-            <a:r>
-              <a:rPr lang="nl-BE" dirty="0" smtClean="0"/>
-              <a:t>Format</a:t>
-            </a:r>
-            <a:endParaRPr lang="nl-BE" dirty="0" smtClean="0"/>
+              <a:rPr lang="en-GB" dirty="0" smtClean="0"/>
+              <a:t>Login system</a:t>
+            </a:r>
+          </a:p>
+          <a:p>
+            <a:r>
+              <a:rPr lang="en-US" dirty="0" smtClean="0"/>
+              <a:t>C</a:t>
+            </a:r>
+            <a:r>
+              <a:rPr lang="en-GB" dirty="0" err="1" smtClean="0"/>
+              <a:t>alendar</a:t>
+            </a:r>
+            <a:endParaRPr lang="en-GB" dirty="0" smtClean="0"/>
+          </a:p>
+          <a:p>
+            <a:r>
+              <a:rPr lang="en-GB" dirty="0" smtClean="0"/>
+              <a:t>Compare and Photos</a:t>
+            </a:r>
+            <a:endParaRPr lang="en-GB" dirty="0"/>
           </a:p>
         </p:txBody>
       </p:sp>
     </p:spTree>
     <p:extLst>
       <p:ext uri="{BB962C8B-B14F-4D97-AF65-F5344CB8AC3E}">
-        <p14:creationId xmlns:p14="http://schemas.microsoft.com/office/powerpoint/2010/main" val="3769618753"/>
+        <p14:creationId xmlns:p14="http://schemas.microsoft.com/office/powerpoint/2010/main" val="3963961395"/>
       </p:ext>
     </p:extLst>
   </p:cSld>
@@ -3401,7 +3394,7 @@
           <a:p>
             <a:r>
               <a:rPr lang="nl-BE" dirty="0" smtClean="0"/>
-              <a:t>User story</a:t>
+              <a:t>Sensors</a:t>
             </a:r>
             <a:endParaRPr lang="nl-BE" dirty="0"/>
           </a:p>
@@ -3423,54 +3416,33 @@
           <a:lstStyle/>
           <a:p>
             <a:r>
+              <a:rPr lang="nl-BE" dirty="0" err="1" smtClean="0"/>
+              <a:t>Raspberry</a:t>
+            </a:r>
+            <a:r>
               <a:rPr lang="nl-BE" dirty="0" smtClean="0"/>
-              <a:t>Optimizing </a:t>
-            </a:r>
+              <a:t> Pi</a:t>
+            </a:r>
+          </a:p>
+          <a:p>
             <a:r>
               <a:rPr lang="nl-BE" dirty="0" err="1" smtClean="0"/>
-              <a:t>cycling</a:t>
-            </a:r>
+              <a:t>Arduino</a:t>
+            </a:r>
+            <a:endParaRPr lang="nl-BE" dirty="0" smtClean="0"/>
+          </a:p>
+          <a:p>
             <a:r>
               <a:rPr lang="nl-BE" dirty="0" smtClean="0"/>
-              <a:t> performance</a:t>
-            </a:r>
-          </a:p>
-          <a:p>
-            <a:r>
-              <a:rPr lang="nl-BE" dirty="0" smtClean="0"/>
-              <a:t>Multiple bikes </a:t>
-            </a:r>
-            <a:r>
-              <a:rPr lang="nl-BE" dirty="0" err="1" smtClean="0"/>
-              <a:t>and</a:t>
-            </a:r>
-            <a:r>
-              <a:rPr lang="nl-BE" dirty="0" smtClean="0"/>
-              <a:t> routes</a:t>
-            </a:r>
-            <a:endParaRPr lang="nl-BE" dirty="0" smtClean="0"/>
-          </a:p>
-          <a:p>
-            <a:r>
-              <a:rPr lang="nl-BE" dirty="0" err="1" smtClean="0"/>
-              <a:t>Selective</a:t>
-            </a:r>
-            <a:r>
-              <a:rPr lang="nl-BE" dirty="0" smtClean="0"/>
-              <a:t> </a:t>
-            </a:r>
-            <a:r>
-              <a:rPr lang="nl-BE" dirty="0" err="1" smtClean="0"/>
-              <a:t>comparing</a:t>
-            </a:r>
-            <a:endParaRPr lang="nl-BE" dirty="0" smtClean="0"/>
+              <a:t>Format</a:t>
+            </a:r>
           </a:p>
         </p:txBody>
       </p:sp>
     </p:spTree>
     <p:extLst>
       <p:ext uri="{BB962C8B-B14F-4D97-AF65-F5344CB8AC3E}">
-        <p14:creationId xmlns:p14="http://schemas.microsoft.com/office/powerpoint/2010/main" val="256873428"/>
+        <p14:creationId xmlns:p14="http://schemas.microsoft.com/office/powerpoint/2010/main" val="3769618753"/>
       </p:ext>
     </p:extLst>
   </p:cSld>
@@ -3515,8 +3487,59 @@
           <a:lstStyle/>
           <a:p>
             <a:r>
+              <a:rPr lang="nl-BE" dirty="0" smtClean="0"/>
+              <a:t>User story</a:t>
+            </a:r>
+            <a:endParaRPr lang="nl-BE" dirty="0"/>
+          </a:p>
+        </p:txBody>
+      </p:sp>
+      <p:sp>
+        <p:nvSpPr>
+          <p:cNvPr id="3" name="Content Placeholder 2"/>
+          <p:cNvSpPr>
+            <a:spLocks noGrp="1"/>
+          </p:cNvSpPr>
+          <p:nvPr>
+            <p:ph idx="1"/>
+          </p:nvPr>
+        </p:nvSpPr>
+        <p:spPr/>
+        <p:txBody>
+          <a:bodyPr/>
+          <a:lstStyle/>
+          <a:p>
+            <a:r>
+              <a:rPr lang="nl-BE" dirty="0" smtClean="0"/>
+              <a:t>Optimizing </a:t>
+            </a:r>
+            <a:r>
               <a:rPr lang="nl-BE" dirty="0" err="1" smtClean="0"/>
-              <a:t>Encountered</a:t>
+              <a:t>cycling</a:t>
+            </a:r>
+            <a:r>
+              <a:rPr lang="nl-BE" dirty="0" smtClean="0"/>
+              <a:t> performance</a:t>
+            </a:r>
+          </a:p>
+          <a:p>
+            <a:r>
+              <a:rPr lang="nl-BE" dirty="0" smtClean="0"/>
+              <a:t>Multiple bikes </a:t>
+            </a:r>
+            <a:r>
+              <a:rPr lang="nl-BE" dirty="0" err="1" smtClean="0"/>
+              <a:t>and</a:t>
+            </a:r>
+            <a:r>
+              <a:rPr lang="nl-BE" dirty="0" smtClean="0"/>
+              <a:t> routes</a:t>
+            </a:r>
+          </a:p>
+          <a:p>
+            <a:r>
+              <a:rPr lang="nl-BE" dirty="0" err="1" smtClean="0"/>
+              <a:t>Selective</a:t>
             </a:r>
             <a:r>
               <a:rPr lang="nl-BE" dirty="0" smtClean="0"/>
@@ -3524,103 +3547,16 @@
             </a:r>
             <a:r>
               <a:rPr lang="nl-BE" dirty="0" err="1" smtClean="0"/>
-              <a:t>Problems</a:t>
-            </a:r>
-            <a:endParaRPr lang="nl-BE" dirty="0"/>
-          </a:p>
-        </p:txBody>
-      </p:sp>
-      <p:sp>
-        <p:nvSpPr>
-          <p:cNvPr id="3" name="Content Placeholder 2"/>
-          <p:cNvSpPr>
-            <a:spLocks noGrp="1"/>
-          </p:cNvSpPr>
-          <p:nvPr>
-            <p:ph idx="1"/>
-          </p:nvPr>
-        </p:nvSpPr>
-        <p:spPr/>
-        <p:txBody>
-          <a:bodyPr/>
-          <a:lstStyle/>
-          <a:p>
-            <a:r>
-              <a:rPr lang="nl-BE" dirty="0" smtClean="0"/>
-              <a:t>GPS conflict</a:t>
-            </a:r>
-          </a:p>
-          <a:p>
-            <a:pPr lvl="1">
-              <a:buFont typeface="Wingdings" pitchFamily="2" charset="2"/>
-              <a:buChar char="Ø"/>
-            </a:pPr>
-            <a:r>
-              <a:rPr lang="nl-BE" dirty="0" smtClean="0"/>
-              <a:t> New </a:t>
-            </a:r>
-            <a:r>
-              <a:rPr lang="nl-BE" dirty="0" err="1" smtClean="0"/>
-              <a:t>libraries</a:t>
-            </a:r>
-            <a:endParaRPr lang="nl-BE" dirty="0"/>
-          </a:p>
-          <a:p>
-            <a:pPr>
-              <a:buFont typeface="Arial" pitchFamily="34" charset="0"/>
-              <a:buChar char="•"/>
-            </a:pPr>
-            <a:r>
-              <a:rPr lang="nl-BE" dirty="0" smtClean="0"/>
-              <a:t>Wrong buttons</a:t>
-            </a:r>
-            <a:endParaRPr lang="nl-BE" dirty="0"/>
-          </a:p>
-          <a:p>
-            <a:pPr lvl="1">
-              <a:buFont typeface="Wingdings" pitchFamily="2" charset="2"/>
-              <a:buChar char="Ø"/>
-            </a:pPr>
-            <a:r>
-              <a:rPr lang="nl-BE" dirty="0" smtClean="0"/>
-              <a:t> New buttons</a:t>
-            </a:r>
-            <a:endParaRPr lang="nl-BE" dirty="0"/>
-          </a:p>
-          <a:p>
-            <a:pPr>
-              <a:buFont typeface="Arial" pitchFamily="34" charset="0"/>
-              <a:buChar char="•"/>
-            </a:pPr>
-            <a:r>
-              <a:rPr lang="nl-BE" dirty="0" smtClean="0"/>
-              <a:t>Connection error</a:t>
-            </a:r>
-          </a:p>
-          <a:p>
-            <a:pPr lvl="1">
-              <a:buFont typeface="Wingdings" pitchFamily="2" charset="2"/>
-              <a:buChar char="Ø"/>
-            </a:pPr>
-            <a:r>
-              <a:rPr lang="nl-BE" dirty="0" smtClean="0"/>
-              <a:t> </a:t>
-            </a:r>
-            <a:r>
-              <a:rPr lang="nl-BE" dirty="0" err="1" smtClean="0"/>
-              <a:t>Impoved</a:t>
-            </a:r>
-            <a:r>
-              <a:rPr lang="nl-BE" dirty="0" smtClean="0"/>
-              <a:t> code</a:t>
-            </a:r>
+              <a:t>comparing</a:t>
+            </a:r>
+            <a:endParaRPr lang="nl-BE" dirty="0" smtClean="0"/>
           </a:p>
         </p:txBody>
       </p:sp>
     </p:spTree>
     <p:extLst>
       <p:ext uri="{BB962C8B-B14F-4D97-AF65-F5344CB8AC3E}">
-        <p14:creationId xmlns:p14="http://schemas.microsoft.com/office/powerpoint/2010/main" val="311801143"/>
+        <p14:creationId xmlns:p14="http://schemas.microsoft.com/office/powerpoint/2010/main" val="256873428"/>
       </p:ext>
     </p:extLst>
   </p:cSld>
@@ -3659,6 +3595,308 @@
         </p:nvSpPr>
         <p:spPr/>
         <p:txBody>
+          <a:bodyPr>
+            <a:normAutofit/>
+          </a:bodyPr>
+          <a:lstStyle/>
+          <a:p>
+            <a:r>
+              <a:rPr lang="nl-BE" dirty="0" err="1" smtClean="0"/>
+              <a:t>Encountered</a:t>
+            </a:r>
+            <a:r>
+              <a:rPr lang="nl-BE" dirty="0" smtClean="0"/>
+              <a:t> </a:t>
+            </a:r>
+            <a:r>
+              <a:rPr lang="nl-BE" dirty="0" err="1" smtClean="0"/>
+              <a:t>Problems</a:t>
+            </a:r>
+            <a:endParaRPr lang="nl-BE" dirty="0"/>
+          </a:p>
+        </p:txBody>
+      </p:sp>
+      <p:sp>
+        <p:nvSpPr>
+          <p:cNvPr id="3" name="Content Placeholder 2"/>
+          <p:cNvSpPr>
+            <a:spLocks noGrp="1"/>
+          </p:cNvSpPr>
+          <p:nvPr>
+            <p:ph idx="1"/>
+          </p:nvPr>
+        </p:nvSpPr>
+        <p:spPr/>
+        <p:txBody>
+          <a:bodyPr/>
+          <a:lstStyle/>
+          <a:p>
+            <a:r>
+              <a:rPr lang="nl-BE" dirty="0" smtClean="0"/>
+              <a:t>GPS conflict</a:t>
+            </a:r>
+          </a:p>
+          <a:p>
+            <a:pPr lvl="1">
+              <a:buFont typeface="Wingdings" pitchFamily="2" charset="2"/>
+              <a:buChar char="Ø"/>
+            </a:pPr>
+            <a:r>
+              <a:rPr lang="nl-BE" dirty="0" smtClean="0"/>
+              <a:t> New </a:t>
+            </a:r>
+            <a:r>
+              <a:rPr lang="nl-BE" dirty="0" err="1" smtClean="0"/>
+              <a:t>libraries</a:t>
+            </a:r>
+            <a:endParaRPr lang="nl-BE" dirty="0"/>
+          </a:p>
+          <a:p>
+            <a:pPr>
+              <a:buFont typeface="Arial" pitchFamily="34" charset="0"/>
+              <a:buChar char="•"/>
+            </a:pPr>
+            <a:r>
+              <a:rPr lang="nl-BE" dirty="0" smtClean="0"/>
+              <a:t>Wrong buttons</a:t>
+            </a:r>
+            <a:endParaRPr lang="nl-BE" dirty="0"/>
+          </a:p>
+          <a:p>
+            <a:pPr lvl="1">
+              <a:buFont typeface="Wingdings" pitchFamily="2" charset="2"/>
+              <a:buChar char="Ø"/>
+            </a:pPr>
+            <a:r>
+              <a:rPr lang="nl-BE" dirty="0" smtClean="0"/>
+              <a:t> New buttons</a:t>
+            </a:r>
+            <a:endParaRPr lang="nl-BE" dirty="0"/>
+          </a:p>
+          <a:p>
+            <a:pPr>
+              <a:buFont typeface="Arial" pitchFamily="34" charset="0"/>
+              <a:buChar char="•"/>
+            </a:pPr>
+            <a:r>
+              <a:rPr lang="nl-BE" dirty="0" smtClean="0"/>
+              <a:t>Connection error</a:t>
+            </a:r>
+          </a:p>
+          <a:p>
+            <a:pPr lvl="1">
+              <a:buFont typeface="Wingdings" pitchFamily="2" charset="2"/>
+              <a:buChar char="Ø"/>
+            </a:pPr>
+            <a:r>
+              <a:rPr lang="nl-BE" dirty="0" smtClean="0"/>
+              <a:t> </a:t>
+            </a:r>
+            <a:r>
+              <a:rPr lang="nl-BE" dirty="0" err="1" smtClean="0"/>
+              <a:t>Impoved</a:t>
+            </a:r>
+            <a:r>
+              <a:rPr lang="nl-BE" dirty="0" smtClean="0"/>
+              <a:t> code</a:t>
+            </a:r>
+          </a:p>
+        </p:txBody>
+      </p:sp>
+    </p:spTree>
+    <p:extLst>
+      <p:ext uri="{BB962C8B-B14F-4D97-AF65-F5344CB8AC3E}">
+        <p14:creationId xmlns:p14="http://schemas.microsoft.com/office/powerpoint/2010/main" val="311801143"/>
+      </p:ext>
+    </p:extLst>
+  </p:cSld>
+  <p:clrMapOvr>
+    <a:masterClrMapping/>
+  </p:clrMapOvr>
+</p:sld>
+</file>
+
+<file path=ppt/slides/slide7.xml><?xml version="1.0" encoding="utf-8"?>
+<p:sld xmlns:a="http://schemas.openxmlformats.org/drawingml/2006/main" xmlns:r="http://schemas.openxmlformats.org/officeDocument/2006/relationships" xmlns:p="http://schemas.openxmlformats.org/presentationml/2006/main">
+  <p:cSld>
+    <p:spTree>
+      <p:nvGrpSpPr>
+        <p:cNvPr id="1" name=""/>
+        <p:cNvGrpSpPr/>
+        <p:nvPr/>
+      </p:nvGrpSpPr>
+      <p:grpSpPr>
+        <a:xfrm>
+          <a:off x="0" y="0"/>
+          <a:ext cx="0" cy="0"/>
+          <a:chOff x="0" y="0"/>
+          <a:chExt cx="0" cy="0"/>
+        </a:xfrm>
+      </p:grpSpPr>
+      <p:sp>
+        <p:nvSpPr>
+          <p:cNvPr id="2" name="Title 1"/>
+          <p:cNvSpPr>
+            <a:spLocks noGrp="1"/>
+          </p:cNvSpPr>
+          <p:nvPr>
+            <p:ph type="title"/>
+          </p:nvPr>
+        </p:nvSpPr>
+        <p:spPr/>
+        <p:txBody>
+          <a:bodyPr>
+            <a:normAutofit/>
+          </a:bodyPr>
+          <a:lstStyle/>
+          <a:p>
+            <a:r>
+              <a:rPr lang="nl-BE" dirty="0" err="1" smtClean="0"/>
+              <a:t>Encountered</a:t>
+            </a:r>
+            <a:r>
+              <a:rPr lang="nl-BE" dirty="0" smtClean="0"/>
+              <a:t> </a:t>
+            </a:r>
+            <a:r>
+              <a:rPr lang="nl-BE" dirty="0" err="1" smtClean="0"/>
+              <a:t>Problems</a:t>
+            </a:r>
+            <a:endParaRPr lang="nl-BE" dirty="0"/>
+          </a:p>
+        </p:txBody>
+      </p:sp>
+      <p:sp>
+        <p:nvSpPr>
+          <p:cNvPr id="3" name="Content Placeholder 2"/>
+          <p:cNvSpPr>
+            <a:spLocks noGrp="1"/>
+          </p:cNvSpPr>
+          <p:nvPr>
+            <p:ph idx="1"/>
+          </p:nvPr>
+        </p:nvSpPr>
+        <p:spPr/>
+        <p:txBody>
+          <a:bodyPr/>
+          <a:lstStyle/>
+          <a:p>
+            <a:r>
+              <a:rPr lang="nl-BE" dirty="0" smtClean="0"/>
+              <a:t>Cross-browser support</a:t>
+            </a:r>
+          </a:p>
+          <a:p>
+            <a:pPr lvl="1">
+              <a:buFont typeface="Wingdings" charset="2"/>
+              <a:buChar char="Ø"/>
+            </a:pPr>
+            <a:r>
+              <a:rPr lang="nl-BE" dirty="0" smtClean="0"/>
+              <a:t>Firefox: Calendar problems</a:t>
+            </a:r>
+          </a:p>
+          <a:p>
+            <a:pPr lvl="1">
+              <a:buFont typeface="Wingdings" charset="2"/>
+              <a:buChar char="Ø"/>
+            </a:pPr>
+            <a:r>
+              <a:rPr lang="nl-BE" dirty="0" smtClean="0"/>
+              <a:t>Google Chrome: jQuery ScrollTo plugin</a:t>
+            </a:r>
+          </a:p>
+          <a:p>
+            <a:r>
+              <a:rPr lang="nl-BE" dirty="0" smtClean="0"/>
+              <a:t>Server issues (jorestha.be)</a:t>
+            </a:r>
+          </a:p>
+          <a:p>
+            <a:pPr lvl="1">
+              <a:buFont typeface="Wingdings" charset="2"/>
+              <a:buChar char="Ø"/>
+            </a:pPr>
+            <a:r>
+              <a:rPr lang="nl-BE" dirty="0" smtClean="0"/>
+              <a:t>Registration php errors</a:t>
+            </a:r>
+          </a:p>
+          <a:p>
+            <a:pPr lvl="1">
+              <a:buFont typeface="Wingdings" charset="2"/>
+              <a:buChar char="Ø"/>
+            </a:pPr>
+            <a:r>
+              <a:rPr lang="en-US" dirty="0" smtClean="0"/>
+              <a:t>C</a:t>
+            </a:r>
+            <a:r>
+              <a:rPr lang="nl-BE" dirty="0" smtClean="0"/>
+              <a:t>onnectivity errors</a:t>
+            </a:r>
+          </a:p>
+          <a:p>
+            <a:r>
+              <a:rPr lang="en-US" dirty="0" smtClean="0"/>
+              <a:t>C</a:t>
+            </a:r>
+            <a:r>
+              <a:rPr lang="nl-BE" dirty="0" smtClean="0"/>
+              <a:t>ode needs to handle wrong data</a:t>
+            </a:r>
+          </a:p>
+          <a:p>
+            <a:r>
+              <a:rPr lang="nl-BE" dirty="0" smtClean="0"/>
+              <a:t>Minor CSS problems</a:t>
+            </a:r>
+            <a:endParaRPr lang="nl-BE" dirty="0" smtClean="0"/>
+          </a:p>
+        </p:txBody>
+      </p:sp>
+    </p:spTree>
+    <p:extLst>
+      <p:ext uri="{BB962C8B-B14F-4D97-AF65-F5344CB8AC3E}">
+        <p14:creationId xmlns:p14="http://schemas.microsoft.com/office/powerpoint/2010/main" val="1352340156"/>
+      </p:ext>
+    </p:extLst>
+  </p:cSld>
+  <p:clrMapOvr>
+    <a:masterClrMapping/>
+  </p:clrMapOvr>
+</p:sld>
+</file>
+
+<file path=ppt/slides/slide8.xml><?xml version="1.0" encoding="utf-8"?>
+<p:sld xmlns:a="http://schemas.openxmlformats.org/drawingml/2006/main" xmlns:r="http://schemas.openxmlformats.org/officeDocument/2006/relationships" xmlns:p="http://schemas.openxmlformats.org/presentationml/2006/main">
+  <p:cSld>
+    <p:spTree>
+      <p:nvGrpSpPr>
+        <p:cNvPr id="1" name=""/>
+        <p:cNvGrpSpPr/>
+        <p:nvPr/>
+      </p:nvGrpSpPr>
+      <p:grpSpPr>
+        <a:xfrm>
+          <a:off x="0" y="0"/>
+          <a:ext cx="0" cy="0"/>
+          <a:chOff x="0" y="0"/>
+          <a:chExt cx="0" cy="0"/>
+        </a:xfrm>
+      </p:grpSpPr>
+      <p:sp>
+        <p:nvSpPr>
+          <p:cNvPr id="2" name="Title 1"/>
+          <p:cNvSpPr>
+            <a:spLocks noGrp="1"/>
+          </p:cNvSpPr>
+          <p:nvPr>
+            <p:ph type="title"/>
+          </p:nvPr>
+        </p:nvSpPr>
+        <p:spPr/>
+        <p:txBody>
           <a:bodyPr/>
           <a:lstStyle/>
           <a:p>
@@ -3741,6 +3979,94 @@
     <p:extLst>
       <p:ext uri="{BB962C8B-B14F-4D97-AF65-F5344CB8AC3E}">
         <p14:creationId xmlns:p14="http://schemas.microsoft.com/office/powerpoint/2010/main" val="2766676707"/>
+      </p:ext>
+    </p:extLst>
+  </p:cSld>
+  <p:clrMapOvr>
+    <a:masterClrMapping/>
+  </p:clrMapOvr>
+</p:sld>
+</file>
+
+<file path=ppt/slides/slide9.xml><?xml version="1.0" encoding="utf-8"?>
+<p:sld xmlns:a="http://schemas.openxmlformats.org/drawingml/2006/main" xmlns:r="http://schemas.openxmlformats.org/officeDocument/2006/relationships" xmlns:p="http://schemas.openxmlformats.org/presentationml/2006/main">
+  <p:cSld>
+    <p:spTree>
+      <p:nvGrpSpPr>
+        <p:cNvPr id="1" name=""/>
+        <p:cNvGrpSpPr/>
+        <p:nvPr/>
+      </p:nvGrpSpPr>
+      <p:grpSpPr>
+        <a:xfrm>
+          <a:off x="0" y="0"/>
+          <a:ext cx="0" cy="0"/>
+          <a:chOff x="0" y="0"/>
+          <a:chExt cx="0" cy="0"/>
+        </a:xfrm>
+      </p:grpSpPr>
+      <p:sp>
+        <p:nvSpPr>
+          <p:cNvPr id="2" name="Title 1"/>
+          <p:cNvSpPr>
+            <a:spLocks noGrp="1"/>
+          </p:cNvSpPr>
+          <p:nvPr>
+            <p:ph type="title"/>
+          </p:nvPr>
+        </p:nvSpPr>
+        <p:spPr/>
+        <p:txBody>
+          <a:bodyPr/>
+          <a:lstStyle/>
+          <a:p>
+            <a:r>
+              <a:rPr lang="nl-BE" dirty="0" smtClean="0"/>
+              <a:t>Expected problems</a:t>
+            </a:r>
+            <a:endParaRPr lang="nl-BE" dirty="0"/>
+          </a:p>
+        </p:txBody>
+      </p:sp>
+      <p:sp>
+        <p:nvSpPr>
+          <p:cNvPr id="3" name="Content Placeholder 2"/>
+          <p:cNvSpPr>
+            <a:spLocks noGrp="1"/>
+          </p:cNvSpPr>
+          <p:nvPr>
+            <p:ph idx="1"/>
+          </p:nvPr>
+        </p:nvSpPr>
+        <p:spPr/>
+        <p:txBody>
+          <a:bodyPr/>
+          <a:lstStyle/>
+          <a:p>
+            <a:r>
+              <a:rPr lang="nl-BE" dirty="0" smtClean="0"/>
+              <a:t>Cross-browser support</a:t>
+            </a:r>
+          </a:p>
+          <a:p>
+            <a:r>
+              <a:rPr lang="nl-BE" dirty="0" smtClean="0"/>
+              <a:t>Minor CSS problems</a:t>
+            </a:r>
+          </a:p>
+          <a:p>
+            <a:r>
+              <a:rPr lang="nl-BE" dirty="0" smtClean="0"/>
+              <a:t>Efficiency</a:t>
+            </a:r>
+            <a:endParaRPr lang="nl-BE" dirty="0"/>
+          </a:p>
+        </p:txBody>
+      </p:sp>
+    </p:spTree>
+    <p:extLst>
+      <p:ext uri="{BB962C8B-B14F-4D97-AF65-F5344CB8AC3E}">
+        <p14:creationId xmlns:p14="http://schemas.microsoft.com/office/powerpoint/2010/main" val="3540119649"/>
       </p:ext>
     </p:extLst>
   </p:cSld>

</xml_diff>

<commit_message>
Minor changes to demo presentation
</commit_message>
<xml_diff>
--- a/Intermediate demo/Demo.pptx
+++ b/Intermediate demo/Demo.pptx
@@ -7,13 +7,12 @@
   <p:sldIdLst>
     <p:sldId id="256" r:id="rId2"/>
     <p:sldId id="263" r:id="rId3"/>
-    <p:sldId id="266" r:id="rId4"/>
-    <p:sldId id="258" r:id="rId5"/>
-    <p:sldId id="262" r:id="rId6"/>
-    <p:sldId id="260" r:id="rId7"/>
+    <p:sldId id="258" r:id="rId4"/>
+    <p:sldId id="262" r:id="rId5"/>
+    <p:sldId id="260" r:id="rId6"/>
+    <p:sldId id="261" r:id="rId7"/>
     <p:sldId id="264" r:id="rId8"/>
-    <p:sldId id="261" r:id="rId9"/>
-    <p:sldId id="265" r:id="rId10"/>
+    <p:sldId id="265" r:id="rId9"/>
   </p:sldIdLst>
   <p:sldSz cx="9144000" cy="6858000" type="screen4x3"/>
   <p:notesSz cx="6858000" cy="9144000"/>
@@ -296,7 +295,7 @@
           <a:p>
             <a:fld id="{C29160A7-5F71-2B44-B5DD-B5EECC5B0C89}" type="datetimeFigureOut">
               <a:rPr lang="en-US" smtClean="0"/>
-              <a:t>20/11/14</a:t>
+              <a:t>24/11/14</a:t>
             </a:fld>
             <a:endParaRPr lang="nl-BE"/>
           </a:p>
@@ -466,7 +465,7 @@
           <a:p>
             <a:fld id="{C29160A7-5F71-2B44-B5DD-B5EECC5B0C89}" type="datetimeFigureOut">
               <a:rPr lang="en-US" smtClean="0"/>
-              <a:t>20/11/14</a:t>
+              <a:t>24/11/14</a:t>
             </a:fld>
             <a:endParaRPr lang="nl-BE"/>
           </a:p>
@@ -646,7 +645,7 @@
           <a:p>
             <a:fld id="{C29160A7-5F71-2B44-B5DD-B5EECC5B0C89}" type="datetimeFigureOut">
               <a:rPr lang="en-US" smtClean="0"/>
-              <a:t>20/11/14</a:t>
+              <a:t>24/11/14</a:t>
             </a:fld>
             <a:endParaRPr lang="nl-BE"/>
           </a:p>
@@ -816,7 +815,7 @@
           <a:p>
             <a:fld id="{C29160A7-5F71-2B44-B5DD-B5EECC5B0C89}" type="datetimeFigureOut">
               <a:rPr lang="en-US" smtClean="0"/>
-              <a:t>20/11/14</a:t>
+              <a:t>24/11/14</a:t>
             </a:fld>
             <a:endParaRPr lang="nl-BE"/>
           </a:p>
@@ -1062,7 +1061,7 @@
           <a:p>
             <a:fld id="{C29160A7-5F71-2B44-B5DD-B5EECC5B0C89}" type="datetimeFigureOut">
               <a:rPr lang="en-US" smtClean="0"/>
-              <a:t>20/11/14</a:t>
+              <a:t>24/11/14</a:t>
             </a:fld>
             <a:endParaRPr lang="nl-BE"/>
           </a:p>
@@ -1350,7 +1349,7 @@
           <a:p>
             <a:fld id="{C29160A7-5F71-2B44-B5DD-B5EECC5B0C89}" type="datetimeFigureOut">
               <a:rPr lang="en-US" smtClean="0"/>
-              <a:t>20/11/14</a:t>
+              <a:t>24/11/14</a:t>
             </a:fld>
             <a:endParaRPr lang="nl-BE"/>
           </a:p>
@@ -1772,7 +1771,7 @@
           <a:p>
             <a:fld id="{C29160A7-5F71-2B44-B5DD-B5EECC5B0C89}" type="datetimeFigureOut">
               <a:rPr lang="en-US" smtClean="0"/>
-              <a:t>20/11/14</a:t>
+              <a:t>24/11/14</a:t>
             </a:fld>
             <a:endParaRPr lang="nl-BE"/>
           </a:p>
@@ -1890,7 +1889,7 @@
           <a:p>
             <a:fld id="{C29160A7-5F71-2B44-B5DD-B5EECC5B0C89}" type="datetimeFigureOut">
               <a:rPr lang="en-US" smtClean="0"/>
-              <a:t>20/11/14</a:t>
+              <a:t>24/11/14</a:t>
             </a:fld>
             <a:endParaRPr lang="nl-BE"/>
           </a:p>
@@ -1985,7 +1984,7 @@
           <a:p>
             <a:fld id="{C29160A7-5F71-2B44-B5DD-B5EECC5B0C89}" type="datetimeFigureOut">
               <a:rPr lang="en-US" smtClean="0"/>
-              <a:t>20/11/14</a:t>
+              <a:t>24/11/14</a:t>
             </a:fld>
             <a:endParaRPr lang="nl-BE"/>
           </a:p>
@@ -2262,7 +2261,7 @@
           <a:p>
             <a:fld id="{C29160A7-5F71-2B44-B5DD-B5EECC5B0C89}" type="datetimeFigureOut">
               <a:rPr lang="en-US" smtClean="0"/>
-              <a:t>20/11/14</a:t>
+              <a:t>24/11/14</a:t>
             </a:fld>
             <a:endParaRPr lang="nl-BE"/>
           </a:p>
@@ -2515,7 +2514,7 @@
           <a:p>
             <a:fld id="{C29160A7-5F71-2B44-B5DD-B5EECC5B0C89}" type="datetimeFigureOut">
               <a:rPr lang="en-US" smtClean="0"/>
-              <a:t>20/11/14</a:t>
+              <a:t>24/11/14</a:t>
             </a:fld>
             <a:endParaRPr lang="nl-BE"/>
           </a:p>
@@ -2728,7 +2727,7 @@
           <a:p>
             <a:fld id="{C29160A7-5F71-2B44-B5DD-B5EECC5B0C89}" type="datetimeFigureOut">
               <a:rPr lang="en-US" smtClean="0"/>
-              <a:t>20/11/14</a:t>
+              <a:t>24/11/14</a:t>
             </a:fld>
             <a:endParaRPr lang="nl-BE"/>
           </a:p>
@@ -3284,7 +3283,7 @@
       </p:grpSpPr>
       <p:sp>
         <p:nvSpPr>
-          <p:cNvPr id="2" name="Titel 1"/>
+          <p:cNvPr id="2" name="Title 1"/>
           <p:cNvSpPr>
             <a:spLocks noGrp="1"/>
           </p:cNvSpPr>
@@ -3294,20 +3293,22 @@
         </p:nvSpPr>
         <p:spPr/>
         <p:txBody>
-          <a:bodyPr/>
-          <a:lstStyle/>
-          <a:p>
-            <a:r>
-              <a:rPr lang="en-GB" dirty="0" smtClean="0"/>
-              <a:t>Progress</a:t>
-            </a:r>
-            <a:endParaRPr lang="en-GB" dirty="0"/>
-          </a:p>
-        </p:txBody>
-      </p:sp>
-      <p:sp>
-        <p:nvSpPr>
-          <p:cNvPr id="3" name="Tijdelijke aanduiding voor inhoud 2"/>
+          <a:bodyPr>
+            <a:normAutofit/>
+          </a:bodyPr>
+          <a:lstStyle/>
+          <a:p>
+            <a:r>
+              <a:rPr lang="nl-BE" dirty="0" smtClean="0"/>
+              <a:t>Sensors</a:t>
+            </a:r>
+            <a:endParaRPr lang="nl-BE" dirty="0"/>
+          </a:p>
+        </p:txBody>
+      </p:sp>
+      <p:sp>
+        <p:nvSpPr>
+          <p:cNvPr id="3" name="Content Placeholder 2"/>
           <p:cNvSpPr>
             <a:spLocks noGrp="1"/>
           </p:cNvSpPr>
@@ -3321,34 +3322,33 @@
           <a:lstStyle/>
           <a:p>
             <a:r>
-              <a:rPr lang="en-GB" dirty="0" smtClean="0"/>
-              <a:t>Login system</a:t>
-            </a:r>
-          </a:p>
-          <a:p>
-            <a:r>
-              <a:rPr lang="en-US" dirty="0" smtClean="0"/>
-              <a:t>C</a:t>
-            </a:r>
-            <a:r>
-              <a:rPr lang="en-GB" dirty="0" err="1" smtClean="0"/>
-              <a:t>alendar</a:t>
-            </a:r>
-            <a:endParaRPr lang="en-GB" dirty="0" smtClean="0"/>
-          </a:p>
-          <a:p>
-            <a:r>
-              <a:rPr lang="en-GB" dirty="0" smtClean="0"/>
-              <a:t>Compare and Photos</a:t>
-            </a:r>
-            <a:endParaRPr lang="en-GB" dirty="0"/>
+              <a:rPr lang="nl-BE" dirty="0" err="1" smtClean="0"/>
+              <a:t>Raspberry</a:t>
+            </a:r>
+            <a:r>
+              <a:rPr lang="nl-BE" dirty="0" smtClean="0"/>
+              <a:t> Pi</a:t>
+            </a:r>
+          </a:p>
+          <a:p>
+            <a:r>
+              <a:rPr lang="nl-BE" dirty="0" err="1" smtClean="0"/>
+              <a:t>Arduino</a:t>
+            </a:r>
+            <a:endParaRPr lang="nl-BE" dirty="0" smtClean="0"/>
+          </a:p>
+          <a:p>
+            <a:r>
+              <a:rPr lang="nl-BE" dirty="0" smtClean="0"/>
+              <a:t>Format</a:t>
+            </a:r>
           </a:p>
         </p:txBody>
       </p:sp>
     </p:spTree>
     <p:extLst>
       <p:ext uri="{BB962C8B-B14F-4D97-AF65-F5344CB8AC3E}">
-        <p14:creationId xmlns:p14="http://schemas.microsoft.com/office/powerpoint/2010/main" val="3963961395"/>
+        <p14:creationId xmlns:p14="http://schemas.microsoft.com/office/powerpoint/2010/main" val="3769618753"/>
       </p:ext>
     </p:extLst>
   </p:cSld>
@@ -3394,7 +3394,7 @@
           <a:p>
             <a:r>
               <a:rPr lang="nl-BE" dirty="0" smtClean="0"/>
-              <a:t>Sensors</a:t>
+              <a:t>User story</a:t>
             </a:r>
             <a:endParaRPr lang="nl-BE" dirty="0"/>
           </a:p>
@@ -3416,33 +3416,53 @@
           <a:lstStyle/>
           <a:p>
             <a:r>
+              <a:rPr lang="nl-BE" dirty="0" smtClean="0"/>
+              <a:t>Optimizing </a:t>
+            </a:r>
+            <a:r>
               <a:rPr lang="nl-BE" dirty="0" err="1" smtClean="0"/>
-              <a:t>Raspberry</a:t>
+              <a:t>cycling</a:t>
             </a:r>
             <a:r>
               <a:rPr lang="nl-BE" dirty="0" smtClean="0"/>
-              <a:t> Pi</a:t>
-            </a:r>
-          </a:p>
-          <a:p>
+              <a:t> performance</a:t>
+            </a:r>
+          </a:p>
+          <a:p>
+            <a:r>
+              <a:rPr lang="nl-BE" dirty="0" smtClean="0"/>
+              <a:t>Multiple bikes </a:t>
+            </a:r>
             <a:r>
               <a:rPr lang="nl-BE" dirty="0" err="1" smtClean="0"/>
-              <a:t>Arduino</a:t>
+              <a:t>and</a:t>
+            </a:r>
+            <a:r>
+              <a:rPr lang="nl-BE" dirty="0" smtClean="0"/>
+              <a:t> routes</a:t>
+            </a:r>
+          </a:p>
+          <a:p>
+            <a:r>
+              <a:rPr lang="nl-BE" dirty="0" err="1" smtClean="0"/>
+              <a:t>Selective</a:t>
+            </a:r>
+            <a:r>
+              <a:rPr lang="nl-BE" dirty="0" smtClean="0"/>
+              <a:t> </a:t>
+            </a:r>
+            <a:r>
+              <a:rPr lang="nl-BE" dirty="0" err="1" smtClean="0"/>
+              <a:t>comparing</a:t>
             </a:r>
             <a:endParaRPr lang="nl-BE" dirty="0" smtClean="0"/>
-          </a:p>
-          <a:p>
-            <a:r>
-              <a:rPr lang="nl-BE" dirty="0" smtClean="0"/>
-              <a:t>Format</a:t>
-            </a:r>
           </a:p>
         </p:txBody>
       </p:sp>
     </p:spTree>
     <p:extLst>
       <p:ext uri="{BB962C8B-B14F-4D97-AF65-F5344CB8AC3E}">
-        <p14:creationId xmlns:p14="http://schemas.microsoft.com/office/powerpoint/2010/main" val="3769618753"/>
+        <p14:creationId xmlns:p14="http://schemas.microsoft.com/office/powerpoint/2010/main" val="256873428"/>
       </p:ext>
     </p:extLst>
   </p:cSld>
@@ -3487,59 +3507,8 @@
           <a:lstStyle/>
           <a:p>
             <a:r>
-              <a:rPr lang="nl-BE" dirty="0" smtClean="0"/>
-              <a:t>User story</a:t>
-            </a:r>
-            <a:endParaRPr lang="nl-BE" dirty="0"/>
-          </a:p>
-        </p:txBody>
-      </p:sp>
-      <p:sp>
-        <p:nvSpPr>
-          <p:cNvPr id="3" name="Content Placeholder 2"/>
-          <p:cNvSpPr>
-            <a:spLocks noGrp="1"/>
-          </p:cNvSpPr>
-          <p:nvPr>
-            <p:ph idx="1"/>
-          </p:nvPr>
-        </p:nvSpPr>
-        <p:spPr/>
-        <p:txBody>
-          <a:bodyPr/>
-          <a:lstStyle/>
-          <a:p>
-            <a:r>
-              <a:rPr lang="nl-BE" dirty="0" smtClean="0"/>
-              <a:t>Optimizing </a:t>
-            </a:r>
-            <a:r>
               <a:rPr lang="nl-BE" dirty="0" err="1" smtClean="0"/>
-              <a:t>cycling</a:t>
-            </a:r>
-            <a:r>
-              <a:rPr lang="nl-BE" dirty="0" smtClean="0"/>
-              <a:t> performance</a:t>
-            </a:r>
-          </a:p>
-          <a:p>
-            <a:r>
-              <a:rPr lang="nl-BE" dirty="0" smtClean="0"/>
-              <a:t>Multiple bikes </a:t>
-            </a:r>
-            <a:r>
-              <a:rPr lang="nl-BE" dirty="0" err="1" smtClean="0"/>
-              <a:t>and</a:t>
-            </a:r>
-            <a:r>
-              <a:rPr lang="nl-BE" dirty="0" smtClean="0"/>
-              <a:t> routes</a:t>
-            </a:r>
-          </a:p>
-          <a:p>
-            <a:r>
-              <a:rPr lang="nl-BE" dirty="0" err="1" smtClean="0"/>
-              <a:t>Selective</a:t>
+              <a:t>Encountered</a:t>
             </a:r>
             <a:r>
               <a:rPr lang="nl-BE" dirty="0" smtClean="0"/>
@@ -3547,16 +3516,103 @@
             </a:r>
             <a:r>
               <a:rPr lang="nl-BE" dirty="0" err="1" smtClean="0"/>
-              <a:t>comparing</a:t>
-            </a:r>
-            <a:endParaRPr lang="nl-BE" dirty="0" smtClean="0"/>
+              <a:t>Problems</a:t>
+            </a:r>
+            <a:endParaRPr lang="nl-BE" dirty="0"/>
+          </a:p>
+        </p:txBody>
+      </p:sp>
+      <p:sp>
+        <p:nvSpPr>
+          <p:cNvPr id="3" name="Content Placeholder 2"/>
+          <p:cNvSpPr>
+            <a:spLocks noGrp="1"/>
+          </p:cNvSpPr>
+          <p:nvPr>
+            <p:ph idx="1"/>
+          </p:nvPr>
+        </p:nvSpPr>
+        <p:spPr/>
+        <p:txBody>
+          <a:bodyPr/>
+          <a:lstStyle/>
+          <a:p>
+            <a:r>
+              <a:rPr lang="nl-BE" dirty="0" smtClean="0"/>
+              <a:t>GPS conflict</a:t>
+            </a:r>
+          </a:p>
+          <a:p>
+            <a:pPr lvl="1">
+              <a:buFont typeface="Wingdings" pitchFamily="2" charset="2"/>
+              <a:buChar char="Ø"/>
+            </a:pPr>
+            <a:r>
+              <a:rPr lang="nl-BE" dirty="0" smtClean="0"/>
+              <a:t> New </a:t>
+            </a:r>
+            <a:r>
+              <a:rPr lang="nl-BE" dirty="0" err="1" smtClean="0"/>
+              <a:t>libraries</a:t>
+            </a:r>
+            <a:endParaRPr lang="nl-BE" dirty="0"/>
+          </a:p>
+          <a:p>
+            <a:pPr>
+              <a:buFont typeface="Arial" pitchFamily="34" charset="0"/>
+              <a:buChar char="•"/>
+            </a:pPr>
+            <a:r>
+              <a:rPr lang="nl-BE" dirty="0" smtClean="0"/>
+              <a:t>Wrong buttons</a:t>
+            </a:r>
+            <a:endParaRPr lang="nl-BE" dirty="0"/>
+          </a:p>
+          <a:p>
+            <a:pPr lvl="1">
+              <a:buFont typeface="Wingdings" pitchFamily="2" charset="2"/>
+              <a:buChar char="Ø"/>
+            </a:pPr>
+            <a:r>
+              <a:rPr lang="nl-BE" dirty="0" smtClean="0"/>
+              <a:t> New buttons</a:t>
+            </a:r>
+            <a:endParaRPr lang="nl-BE" dirty="0"/>
+          </a:p>
+          <a:p>
+            <a:pPr>
+              <a:buFont typeface="Arial" pitchFamily="34" charset="0"/>
+              <a:buChar char="•"/>
+            </a:pPr>
+            <a:r>
+              <a:rPr lang="nl-BE" dirty="0" smtClean="0"/>
+              <a:t>Connection error</a:t>
+            </a:r>
+          </a:p>
+          <a:p>
+            <a:pPr lvl="1">
+              <a:buFont typeface="Wingdings" pitchFamily="2" charset="2"/>
+              <a:buChar char="Ø"/>
+            </a:pPr>
+            <a:r>
+              <a:rPr lang="nl-BE" dirty="0" smtClean="0"/>
+              <a:t> </a:t>
+            </a:r>
+            <a:r>
+              <a:rPr lang="nl-BE" dirty="0" smtClean="0"/>
+              <a:t>Improved </a:t>
+            </a:r>
+            <a:r>
+              <a:rPr lang="nl-BE" dirty="0" smtClean="0"/>
+              <a:t>code</a:t>
+            </a:r>
           </a:p>
         </p:txBody>
       </p:sp>
     </p:spTree>
     <p:extLst>
       <p:ext uri="{BB962C8B-B14F-4D97-AF65-F5344CB8AC3E}">
-        <p14:creationId xmlns:p14="http://schemas.microsoft.com/office/powerpoint/2010/main" val="256873428"/>
+        <p14:creationId xmlns:p14="http://schemas.microsoft.com/office/powerpoint/2010/main" val="311801143"/>
       </p:ext>
     </p:extLst>
   </p:cSld>
@@ -3595,14 +3651,39 @@
         </p:nvSpPr>
         <p:spPr/>
         <p:txBody>
-          <a:bodyPr>
-            <a:normAutofit/>
-          </a:bodyPr>
-          <a:lstStyle/>
-          <a:p>
+          <a:bodyPr/>
+          <a:lstStyle/>
+          <a:p>
+            <a:r>
+              <a:rPr lang="nl-BE" dirty="0" smtClean="0"/>
+              <a:t>Expected problems</a:t>
+            </a:r>
+            <a:endParaRPr lang="nl-BE" dirty="0"/>
+          </a:p>
+        </p:txBody>
+      </p:sp>
+      <p:sp>
+        <p:nvSpPr>
+          <p:cNvPr id="3" name="Content Placeholder 2"/>
+          <p:cNvSpPr>
+            <a:spLocks noGrp="1"/>
+          </p:cNvSpPr>
+          <p:nvPr>
+            <p:ph idx="1"/>
+          </p:nvPr>
+        </p:nvSpPr>
+        <p:spPr/>
+        <p:txBody>
+          <a:bodyPr/>
+          <a:lstStyle/>
+          <a:p>
+            <a:r>
+              <a:rPr lang="nl-BE" dirty="0" smtClean="0"/>
+              <a:t>Bugs &amp; </a:t>
+            </a:r>
             <a:r>
               <a:rPr lang="nl-BE" dirty="0" err="1" smtClean="0"/>
-              <a:t>Encountered</a:t>
+              <a:t>unhandled</a:t>
             </a:r>
             <a:r>
               <a:rPr lang="nl-BE" dirty="0" smtClean="0"/>
@@ -3610,103 +3691,48 @@
             </a:r>
             <a:r>
               <a:rPr lang="nl-BE" dirty="0" err="1" smtClean="0"/>
-              <a:t>Problems</a:t>
+              <a:t>exceptions</a:t>
+            </a:r>
+            <a:endParaRPr lang="nl-BE" dirty="0" smtClean="0"/>
+          </a:p>
+          <a:p>
+            <a:r>
+              <a:rPr lang="nl-BE" dirty="0" err="1" smtClean="0"/>
+              <a:t>Mounting</a:t>
+            </a:r>
+            <a:r>
+              <a:rPr lang="nl-BE" dirty="0" smtClean="0"/>
+              <a:t> the device</a:t>
+            </a:r>
+          </a:p>
+          <a:p>
+            <a:r>
+              <a:rPr lang="nl-BE" dirty="0" smtClean="0"/>
+              <a:t>Web </a:t>
+            </a:r>
+            <a:r>
+              <a:rPr lang="nl-BE" dirty="0" err="1" smtClean="0"/>
+              <a:t>errors</a:t>
+            </a:r>
+            <a:endParaRPr lang="nl-BE" dirty="0" smtClean="0"/>
+          </a:p>
+          <a:p>
+            <a:r>
+              <a:rPr lang="nl-BE" dirty="0" smtClean="0"/>
+              <a:t>Data </a:t>
+            </a:r>
+            <a:r>
+              <a:rPr lang="nl-BE" dirty="0" err="1" smtClean="0"/>
+              <a:t>errors</a:t>
             </a:r>
             <a:endParaRPr lang="nl-BE" dirty="0"/>
-          </a:p>
-        </p:txBody>
-      </p:sp>
-      <p:sp>
-        <p:nvSpPr>
-          <p:cNvPr id="3" name="Content Placeholder 2"/>
-          <p:cNvSpPr>
-            <a:spLocks noGrp="1"/>
-          </p:cNvSpPr>
-          <p:nvPr>
-            <p:ph idx="1"/>
-          </p:nvPr>
-        </p:nvSpPr>
-        <p:spPr/>
-        <p:txBody>
-          <a:bodyPr/>
-          <a:lstStyle/>
-          <a:p>
-            <a:r>
-              <a:rPr lang="nl-BE" dirty="0" smtClean="0"/>
-              <a:t>GPS conflict</a:t>
-            </a:r>
-          </a:p>
-          <a:p>
-            <a:pPr lvl="1">
-              <a:buFont typeface="Wingdings" pitchFamily="2" charset="2"/>
-              <a:buChar char="Ø"/>
-            </a:pPr>
-            <a:r>
-              <a:rPr lang="nl-BE" dirty="0" smtClean="0"/>
-              <a:t> New </a:t>
-            </a:r>
-            <a:r>
-              <a:rPr lang="nl-BE" dirty="0" err="1" smtClean="0"/>
-              <a:t>libraries</a:t>
-            </a:r>
-            <a:endParaRPr lang="nl-BE" dirty="0"/>
-          </a:p>
-          <a:p>
-            <a:pPr>
-              <a:buFont typeface="Arial" pitchFamily="34" charset="0"/>
-              <a:buChar char="•"/>
-            </a:pPr>
-            <a:r>
-              <a:rPr lang="nl-BE" dirty="0" smtClean="0"/>
-              <a:t>Wrong buttons</a:t>
-            </a:r>
-            <a:endParaRPr lang="nl-BE" dirty="0"/>
-          </a:p>
-          <a:p>
-            <a:pPr lvl="1">
-              <a:buFont typeface="Wingdings" pitchFamily="2" charset="2"/>
-              <a:buChar char="Ø"/>
-            </a:pPr>
-            <a:r>
-              <a:rPr lang="nl-BE" dirty="0" smtClean="0"/>
-              <a:t> New buttons</a:t>
-            </a:r>
-            <a:endParaRPr lang="nl-BE" dirty="0"/>
-          </a:p>
-          <a:p>
-            <a:pPr>
-              <a:buFont typeface="Arial" pitchFamily="34" charset="0"/>
-              <a:buChar char="•"/>
-            </a:pPr>
-            <a:r>
-              <a:rPr lang="nl-BE" dirty="0" smtClean="0"/>
-              <a:t>Connection error</a:t>
-            </a:r>
-          </a:p>
-          <a:p>
-            <a:pPr lvl="1">
-              <a:buFont typeface="Wingdings" pitchFamily="2" charset="2"/>
-              <a:buChar char="Ø"/>
-            </a:pPr>
-            <a:r>
-              <a:rPr lang="nl-BE" dirty="0" smtClean="0"/>
-              <a:t> </a:t>
-            </a:r>
-            <a:r>
-              <a:rPr lang="nl-BE" dirty="0" err="1" smtClean="0"/>
-              <a:t>Impoved</a:t>
-            </a:r>
-            <a:r>
-              <a:rPr lang="nl-BE" dirty="0" smtClean="0"/>
-              <a:t> code</a:t>
-            </a:r>
           </a:p>
         </p:txBody>
       </p:sp>
     </p:spTree>
     <p:extLst>
       <p:ext uri="{BB962C8B-B14F-4D97-AF65-F5344CB8AC3E}">
-        <p14:creationId xmlns:p14="http://schemas.microsoft.com/office/powerpoint/2010/main" val="311801143"/>
+        <p14:creationId xmlns:p14="http://schemas.microsoft.com/office/powerpoint/2010/main" val="2766676707"/>
       </p:ext>
     </p:extLst>
   </p:cSld>
@@ -3778,7 +3804,9 @@
         </p:nvSpPr>
         <p:spPr/>
         <p:txBody>
-          <a:bodyPr/>
+          <a:bodyPr>
+            <a:normAutofit fontScale="92500" lnSpcReduction="10000"/>
+          </a:bodyPr>
           <a:lstStyle/>
           <a:p>
             <a:r>
@@ -3851,7 +3879,12 @@
               <a:rPr lang="nl-BE" dirty="0" smtClean="0"/>
               <a:t>Minor CSS problems</a:t>
             </a:r>
-            <a:endParaRPr lang="nl-BE" dirty="0" smtClean="0"/>
+          </a:p>
+          <a:p>
+            <a:r>
+              <a:rPr lang="nl-BE" dirty="0" smtClean="0"/>
+              <a:t>JS asynchronous functions</a:t>
+            </a:r>
           </a:p>
         </p:txBody>
       </p:sp>
@@ -3925,126 +3958,6 @@
           <a:p>
             <a:r>
               <a:rPr lang="nl-BE" dirty="0" smtClean="0"/>
-              <a:t>Bugs &amp; </a:t>
-            </a:r>
-            <a:r>
-              <a:rPr lang="nl-BE" dirty="0" err="1" smtClean="0"/>
-              <a:t>unhandled</a:t>
-            </a:r>
-            <a:r>
-              <a:rPr lang="nl-BE" dirty="0" smtClean="0"/>
-              <a:t> </a:t>
-            </a:r>
-            <a:r>
-              <a:rPr lang="nl-BE" dirty="0" err="1" smtClean="0"/>
-              <a:t>exceptions</a:t>
-            </a:r>
-            <a:endParaRPr lang="nl-BE" dirty="0" smtClean="0"/>
-          </a:p>
-          <a:p>
-            <a:r>
-              <a:rPr lang="nl-BE" dirty="0" err="1" smtClean="0"/>
-              <a:t>Mounting</a:t>
-            </a:r>
-            <a:r>
-              <a:rPr lang="nl-BE" dirty="0" smtClean="0"/>
-              <a:t> the device</a:t>
-            </a:r>
-          </a:p>
-          <a:p>
-            <a:r>
-              <a:rPr lang="nl-BE" dirty="0" smtClean="0"/>
-              <a:t>Web </a:t>
-            </a:r>
-            <a:r>
-              <a:rPr lang="nl-BE" dirty="0" err="1" smtClean="0"/>
-              <a:t>errors</a:t>
-            </a:r>
-            <a:endParaRPr lang="nl-BE" dirty="0" smtClean="0"/>
-          </a:p>
-          <a:p>
-            <a:r>
-              <a:rPr lang="nl-BE" dirty="0" smtClean="0"/>
-              <a:t>Data </a:t>
-            </a:r>
-            <a:r>
-              <a:rPr lang="nl-BE" dirty="0" err="1" smtClean="0"/>
-              <a:t>errors</a:t>
-            </a:r>
-            <a:endParaRPr lang="nl-BE" dirty="0"/>
-          </a:p>
-        </p:txBody>
-      </p:sp>
-    </p:spTree>
-    <p:extLst>
-      <p:ext uri="{BB962C8B-B14F-4D97-AF65-F5344CB8AC3E}">
-        <p14:creationId xmlns:p14="http://schemas.microsoft.com/office/powerpoint/2010/main" val="2766676707"/>
-      </p:ext>
-    </p:extLst>
-  </p:cSld>
-  <p:clrMapOvr>
-    <a:masterClrMapping/>
-  </p:clrMapOvr>
-</p:sld>
-</file>
-
-<file path=ppt/slides/slide9.xml><?xml version="1.0" encoding="utf-8"?>
-<p:sld xmlns:a="http://schemas.openxmlformats.org/drawingml/2006/main" xmlns:r="http://schemas.openxmlformats.org/officeDocument/2006/relationships" xmlns:p="http://schemas.openxmlformats.org/presentationml/2006/main">
-  <p:cSld>
-    <p:spTree>
-      <p:nvGrpSpPr>
-        <p:cNvPr id="1" name=""/>
-        <p:cNvGrpSpPr/>
-        <p:nvPr/>
-      </p:nvGrpSpPr>
-      <p:grpSpPr>
-        <a:xfrm>
-          <a:off x="0" y="0"/>
-          <a:ext cx="0" cy="0"/>
-          <a:chOff x="0" y="0"/>
-          <a:chExt cx="0" cy="0"/>
-        </a:xfrm>
-      </p:grpSpPr>
-      <p:sp>
-        <p:nvSpPr>
-          <p:cNvPr id="2" name="Title 1"/>
-          <p:cNvSpPr>
-            <a:spLocks noGrp="1"/>
-          </p:cNvSpPr>
-          <p:nvPr>
-            <p:ph type="title"/>
-          </p:nvPr>
-        </p:nvSpPr>
-        <p:spPr/>
-        <p:txBody>
-          <a:bodyPr/>
-          <a:lstStyle/>
-          <a:p>
-            <a:r>
-              <a:rPr lang="nl-BE" dirty="0" smtClean="0"/>
-              <a:t>Expected problems</a:t>
-            </a:r>
-            <a:endParaRPr lang="nl-BE" dirty="0"/>
-          </a:p>
-        </p:txBody>
-      </p:sp>
-      <p:sp>
-        <p:nvSpPr>
-          <p:cNvPr id="3" name="Content Placeholder 2"/>
-          <p:cNvSpPr>
-            <a:spLocks noGrp="1"/>
-          </p:cNvSpPr>
-          <p:nvPr>
-            <p:ph idx="1"/>
-          </p:nvPr>
-        </p:nvSpPr>
-        <p:spPr/>
-        <p:txBody>
-          <a:bodyPr/>
-          <a:lstStyle/>
-          <a:p>
-            <a:r>
-              <a:rPr lang="nl-BE" dirty="0" smtClean="0"/>
               <a:t>Cross-browser support</a:t>
             </a:r>
           </a:p>
@@ -4058,6 +3971,12 @@
             <a:r>
               <a:rPr lang="nl-BE" dirty="0" smtClean="0"/>
               <a:t>Efficiency</a:t>
+            </a:r>
+          </a:p>
+          <a:p>
+            <a:r>
+              <a:rPr lang="nl-BE" dirty="0" smtClean="0"/>
+              <a:t>Enough time?</a:t>
             </a:r>
             <a:endParaRPr lang="nl-BE" dirty="0"/>
           </a:p>

</xml_diff>